<commit_message>
Changed the title to match the file name 05
</commit_message>
<xml_diff>
--- a/05-refactoring_a_custom_resource.pptx
+++ b/05-refactoring_a_custom_resource.pptx
@@ -306,7 +306,7 @@
               <a:pPr>
                 <a:defRPr/>
               </a:pPr>
-              <a:t>2016-10-05</a:t>
+              <a:t>2016-10-07</a:t>
             </a:fld>
             <a:endParaRPr lang="en-US" dirty="0"/>
           </a:p>
@@ -489,7 +489,7 @@
               <a:pPr>
                 <a:defRPr/>
               </a:pPr>
-              <a:t>2016-10-05</a:t>
+              <a:t>2016-10-07</a:t>
             </a:fld>
             <a:endParaRPr lang="en-US" dirty="0"/>
           </a:p>
@@ -6063,14 +6063,14 @@
           </a:ln>
           <a:extLst>
             <a:ext uri="{909E8E84-426E-40dd-AFC4-6F175D3DCCD1}">
-              <a14:hiddenFill xmlns:a14="http://schemas.microsoft.com/office/drawing/2010/main" xmlns="">
+              <a14:hiddenFill xmlns="" xmlns:a14="http://schemas.microsoft.com/office/drawing/2010/main">
                 <a:solidFill>
                   <a:srgbClr val="FFFFFF"/>
                 </a:solidFill>
               </a14:hiddenFill>
             </a:ext>
             <a:ext uri="{91240B29-F687-4f45-9708-019B960494DF}">
-              <a14:hiddenLine xmlns:a14="http://schemas.microsoft.com/office/drawing/2010/main" xmlns="" w="9525">
+              <a14:hiddenLine xmlns="" xmlns:a14="http://schemas.microsoft.com/office/drawing/2010/main" w="9525">
                 <a:solidFill>
                   <a:srgbClr val="000000"/>
                 </a:solidFill>
@@ -6218,14 +6218,14 @@
           </a:ln>
           <a:extLst>
             <a:ext uri="{909E8E84-426E-40dd-AFC4-6F175D3DCCD1}">
-              <a14:hiddenFill xmlns:a14="http://schemas.microsoft.com/office/drawing/2010/main" xmlns="">
+              <a14:hiddenFill xmlns="" xmlns:a14="http://schemas.microsoft.com/office/drawing/2010/main">
                 <a:solidFill>
                   <a:srgbClr val="FFFFFF"/>
                 </a:solidFill>
               </a14:hiddenFill>
             </a:ext>
             <a:ext uri="{91240B29-F687-4f45-9708-019B960494DF}">
-              <a14:hiddenLine xmlns:a14="http://schemas.microsoft.com/office/drawing/2010/main" xmlns="" w="9525">
+              <a14:hiddenLine xmlns="" xmlns:a14="http://schemas.microsoft.com/office/drawing/2010/main" w="9525">
                 <a:solidFill>
                   <a:srgbClr val="000000"/>
                 </a:solidFill>
@@ -6681,14 +6681,14 @@
           </a:ln>
           <a:extLst>
             <a:ext uri="{909E8E84-426E-40dd-AFC4-6F175D3DCCD1}">
-              <a14:hiddenFill xmlns:a14="http://schemas.microsoft.com/office/drawing/2010/main" xmlns="">
+              <a14:hiddenFill xmlns="" xmlns:a14="http://schemas.microsoft.com/office/drawing/2010/main">
                 <a:solidFill>
                   <a:srgbClr val="FFFFFF"/>
                 </a:solidFill>
               </a14:hiddenFill>
             </a:ext>
             <a:ext uri="{91240B29-F687-4f45-9708-019B960494DF}">
-              <a14:hiddenLine xmlns:a14="http://schemas.microsoft.com/office/drawing/2010/main" xmlns="" w="9525">
+              <a14:hiddenLine xmlns="" xmlns:a14="http://schemas.microsoft.com/office/drawing/2010/main" w="9525">
                 <a:solidFill>
                   <a:srgbClr val="000000"/>
                 </a:solidFill>
@@ -8137,14 +8137,14 @@
           </a:ln>
           <a:extLst>
             <a:ext uri="{909E8E84-426E-40dd-AFC4-6F175D3DCCD1}">
-              <a14:hiddenFill xmlns:a14="http://schemas.microsoft.com/office/drawing/2010/main" xmlns="">
+              <a14:hiddenFill xmlns="" xmlns:a14="http://schemas.microsoft.com/office/drawing/2010/main">
                 <a:solidFill>
                   <a:srgbClr val="FFFFFF"/>
                 </a:solidFill>
               </a14:hiddenFill>
             </a:ext>
             <a:ext uri="{91240B29-F687-4f45-9708-019B960494DF}">
-              <a14:hiddenLine xmlns:a14="http://schemas.microsoft.com/office/drawing/2010/main" xmlns="" w="9525">
+              <a14:hiddenLine xmlns="" xmlns:a14="http://schemas.microsoft.com/office/drawing/2010/main" w="9525">
                 <a:solidFill>
                   <a:srgbClr val="000000"/>
                 </a:solidFill>
@@ -9498,14 +9498,14 @@
           </a:ln>
           <a:extLst>
             <a:ext uri="{909E8E84-426E-40dd-AFC4-6F175D3DCCD1}">
-              <a14:hiddenFill xmlns:a14="http://schemas.microsoft.com/office/drawing/2010/main" xmlns="">
+              <a14:hiddenFill xmlns="" xmlns:a14="http://schemas.microsoft.com/office/drawing/2010/main">
                 <a:solidFill>
                   <a:srgbClr val="FFFFFF"/>
                 </a:solidFill>
               </a14:hiddenFill>
             </a:ext>
             <a:ext uri="{91240B29-F687-4f45-9708-019B960494DF}">
-              <a14:hiddenLine xmlns:a14="http://schemas.microsoft.com/office/drawing/2010/main" xmlns="" w="9525">
+              <a14:hiddenLine xmlns="" xmlns:a14="http://schemas.microsoft.com/office/drawing/2010/main" w="9525">
                 <a:solidFill>
                   <a:srgbClr val="000000"/>
                 </a:solidFill>
@@ -10028,14 +10028,14 @@
           </a:ln>
           <a:extLst>
             <a:ext uri="{909E8E84-426E-40dd-AFC4-6F175D3DCCD1}">
-              <a14:hiddenFill xmlns:a14="http://schemas.microsoft.com/office/drawing/2010/main" xmlns="">
+              <a14:hiddenFill xmlns="" xmlns:a14="http://schemas.microsoft.com/office/drawing/2010/main">
                 <a:solidFill>
                   <a:srgbClr val="FFFFFF"/>
                 </a:solidFill>
               </a14:hiddenFill>
             </a:ext>
             <a:ext uri="{91240B29-F687-4f45-9708-019B960494DF}">
-              <a14:hiddenLine xmlns:a14="http://schemas.microsoft.com/office/drawing/2010/main" xmlns="" w="9525">
+              <a14:hiddenLine xmlns="" xmlns:a14="http://schemas.microsoft.com/office/drawing/2010/main" w="9525">
                 <a:solidFill>
                   <a:srgbClr val="000000"/>
                 </a:solidFill>
@@ -10567,14 +10567,14 @@
           </a:ln>
           <a:extLst>
             <a:ext uri="{909E8E84-426E-40dd-AFC4-6F175D3DCCD1}">
-              <a14:hiddenFill xmlns:a14="http://schemas.microsoft.com/office/drawing/2010/main" xmlns="">
+              <a14:hiddenFill xmlns="" xmlns:a14="http://schemas.microsoft.com/office/drawing/2010/main">
                 <a:solidFill>
                   <a:srgbClr val="FFFFFF"/>
                 </a:solidFill>
               </a14:hiddenFill>
             </a:ext>
             <a:ext uri="{91240B29-F687-4f45-9708-019B960494DF}">
-              <a14:hiddenLine xmlns:a14="http://schemas.microsoft.com/office/drawing/2010/main" xmlns="" w="9525">
+              <a14:hiddenLine xmlns="" xmlns:a14="http://schemas.microsoft.com/office/drawing/2010/main" w="9525">
                 <a:solidFill>
                   <a:srgbClr val="000000"/>
                 </a:solidFill>
@@ -11514,14 +11514,14 @@
           </a:ln>
           <a:extLst>
             <a:ext uri="{909E8E84-426E-40dd-AFC4-6F175D3DCCD1}">
-              <a14:hiddenFill xmlns:a14="http://schemas.microsoft.com/office/drawing/2010/main" xmlns="">
+              <a14:hiddenFill xmlns="" xmlns:a14="http://schemas.microsoft.com/office/drawing/2010/main">
                 <a:solidFill>
                   <a:srgbClr val="FFFFFF"/>
                 </a:solidFill>
               </a14:hiddenFill>
             </a:ext>
             <a:ext uri="{91240B29-F687-4f45-9708-019B960494DF}">
-              <a14:hiddenLine xmlns:a14="http://schemas.microsoft.com/office/drawing/2010/main" xmlns="" w="9525">
+              <a14:hiddenLine xmlns="" xmlns:a14="http://schemas.microsoft.com/office/drawing/2010/main" w="9525">
                 <a:solidFill>
                   <a:srgbClr val="000000"/>
                 </a:solidFill>
@@ -12294,14 +12294,14 @@
           </a:ln>
           <a:extLst>
             <a:ext uri="{909E8E84-426E-40dd-AFC4-6F175D3DCCD1}">
-              <a14:hiddenFill xmlns:a14="http://schemas.microsoft.com/office/drawing/2010/main" xmlns="">
+              <a14:hiddenFill xmlns="" xmlns:a14="http://schemas.microsoft.com/office/drawing/2010/main">
                 <a:solidFill>
                   <a:srgbClr val="FFFFFF"/>
                 </a:solidFill>
               </a14:hiddenFill>
             </a:ext>
             <a:ext uri="{91240B29-F687-4f45-9708-019B960494DF}">
-              <a14:hiddenLine xmlns:a14="http://schemas.microsoft.com/office/drawing/2010/main" xmlns="" w="9525">
+              <a14:hiddenLine xmlns="" xmlns:a14="http://schemas.microsoft.com/office/drawing/2010/main" w="9525">
                 <a:solidFill>
                   <a:srgbClr val="000000"/>
                 </a:solidFill>
@@ -13075,8 +13075,8 @@
           <a:lstStyle/>
           <a:p>
             <a:r>
-              <a:rPr lang="en-US" dirty="0" smtClean="0"/>
-              <a:t>Refactoring Custom Resources</a:t>
+              <a:rPr lang="en-US" smtClean="0"/>
+              <a:t>Refactoring a Custom Resource</a:t>
             </a:r>
             <a:endParaRPr lang="en-US" dirty="0"/>
           </a:p>

</xml_diff>